<commit_message>
changes made to ppt gen
</commit_message>
<xml_diff>
--- a/data/output/pptx/combined_stories.pptx
+++ b/data/output/pptx/combined_stories.pptx
@@ -3109,18 +3109,21 @@
           <a:lstStyle/>
           <a:p>
             <a:r>
+              <a:rPr sz="1200"/>
               <a:t>Story 1 Kids Are  </a:t>
             </a:r>
           </a:p>
           <a:p>
             <a:r>
-              <a:t>**Title: Rohan, Aisha, and the Joy of Sharing Holi**</a:t>
+              <a:rPr sz="1200"/>
+              <a:t>**Title: The Colors of Kindness**</a:t>
             </a:r>
           </a:p>
           <a:p/>
           <a:p>
             <a:r>
-              <a:t>In a vibrant village, the air buzzed with exci</a:t>
+              <a:rPr sz="1200"/>
+              <a:t>In a vibrant village, the air buzzed with excitement as children </a:t>
             </a:r>
           </a:p>
           <a:p/>
@@ -3178,7 +3181,8 @@
           <a:p/>
           <a:p>
             <a:r>
-              <a:t>**Title: Rohan, Aisha, and the Joy of Sharing Holi** In a vibrant village, the air buzzed with excitement as Holi approached. Rohan and Aisha were eager to celebrate, preparing colorful powders and sweet treats. Their laughter echoed as they anticipated the festival of colors. As they played, they noticed some children watching from a distance, dressed in worn clothes. Rohan and Aisha exchanged glances, their joy momentarily dimmed by the sight. Determined to share their happiness, they invited the children to join. With open hearts, they offered colors and sweets, transforming the onlookers into participants. The group played together, their laughter mingling in the air. Suddenly, a gentle voice praised their kindness. It was Lord Rama, appearing with a warm smile. He commended Rohan and Aisha for understanding that true joy comes from sharing. The children celebrated together, their bond strengthened by kindness. As the day ended, they learned that sharing happiness brings the greatest joy. **Moral:** Kindness and sharing bring true happiness, as taught by Lord Rama.</a:t>
+              <a:rPr sz="1200"/>
+              <a:t>**Title: The Colors of Kindness** In a vibrant village, the air buzzed with excitement as children prepared for Holi. Three friends, Rohan, Aisha, and Karan, eagerly gathered their colors and sweets. As they played, they noticed some poor children watching from a distance, their eyes wide with longing. Rohan whispered, "Look, they want to join but can't." Aisha nodded, and Karan suggested, "Let's share our colors and sweets!" They approached the poor children, offering them the festive treats. Just then, a gentle voice spoke, "Your hearts are as colorful as the Holi hues." It was Lord Rama, appearing with a warm smile. "Kindness is the greatest virtue," he said. "Remember, sharing brings joy to all." The children beamed, learning that true happiness comes from kindness. From that day on, they celebrated Holi with everyone, spreading joy and colors to all. **Moral:** Kindness and sharing bring the greatest joy, as taught by Lord Rama.</a:t>
             </a:r>
           </a:p>
           <a:p/>
@@ -3234,7 +3238,6 @@
           <a:bodyPr/>
           <a:lstStyle/>
           <a:p/>
-          <a:p/>
         </p:txBody>
       </p:sp>
       <p:sp>
@@ -3256,7 +3259,7 @@
       </p:sp>
       <p:pic>
         <p:nvPicPr>
-          <p:cNvPr id="4" name="Picture 3" descr="tmpi868ff28.png"/>
+          <p:cNvPr id="4" name="Picture 3" descr="tmpay_xgw5s.png"/>
           <p:cNvPicPr>
             <a:picLocks noChangeAspect="1"/>
           </p:cNvPicPr>
@@ -3312,12 +3315,21 @@
           <a:lstStyle/>
           <a:p>
             <a:r>
+              <a:rPr sz="1200"/>
               <a:t>Story 2 Children E</a:t>
             </a:r>
           </a:p>
           <a:p>
             <a:r>
-              <a:t>Once upon a time, in a small village nestled between green hills, there was a sparkling river that f</a:t>
+              <a:rPr sz="1200"/>
+              <a:t>**The Magical River Stone**</a:t>
+            </a:r>
+          </a:p>
+          <a:p/>
+          <a:p>
+            <a:r>
+              <a:rPr sz="1200"/>
+              <a:t>On a sunny day, in a small village, three friends—Ravi, Leela, and Kish</a:t>
             </a:r>
           </a:p>
           <a:p/>
@@ -3375,7 +3387,8 @@
           <a:p/>
           <a:p>
             <a:r>
-              <a:t>Once upon a time, in a small village nestled between green hills, there was a sparkling river that flowed gently through the heart of the village. During the dry season, the river bed became a vast, sandy playground where children loved to gather. One sunny afternoon, Rohan and Aisha, along with their friends, were playing on the river bed. They skipped stones across the water, built tall sandcastles, and laughed as the warm breeze carried their giggles. The river's edge was alive with their joy. As they played, Rohan spotted something shiny buried in the sand. Excited, he brushed away the grains and found a small, glowing stone. It sparkled like the stars in the night sky. "Look what I found!" Rohan exclaimed. Aisha's eyes widened with curiosity. "It's magical!" she whispered. The children gathered around, eager to see the stone's magic. Rohan held it up, but nothing happened. Aisha suggested, "Maybe it needs all of us to make it work." Reluctantly, Rohan handed the stone to Aisha. She smiled and said, "Let's share it." The children formed a circle, each taking a turn to hold the stone. As they shared, the stone began to glow brighter, and a soft hum filled the air. Suddenly, the stone rose into the air, creating a dazzling light show. The children gasped in delight. The stone spoke, "The true magic lies in sharing and working together." From that day on, Rohan, Aisha, and their friends learned that when they shared and cooperated, they could achieve anything. And so, they played together, their bond stronger than ever, with the magical stone reminding them of the power of teamwork and kindness. The end.</a:t>
+              <a:rPr sz="1200"/>
+              <a:t>**The Magical River Stone** On a sunny day, in a small village, three friends—Ravi, Leela, and Kishan—played by the riverside. The clear water sparkled, and the warm sun shone through the trees. They skipped stones and built sandcastles, laughing joyfully. While Ravi waded through the shallow water, he found a shiny object. "Look!" he exclaimed, holding up a glowing stone. As they gathered around, the stone began to glow, and a gentle breeze rustled the trees. Suddenly, Hanuman, the mighty monkey god from the Ramayana, appeared before them. "Hello, young friends," he said with a smile. "I have been watching you. You have kind hearts, and this stone has chosen you to share a special message." Hanuman explained, "Courage is not just about strength; it's about helping others. Remember, true strength lies in kindness and support." Inspired, the children decided to help an elderly neighbor who struggled with chores. Together, they carried firewood and fetched water, making her day brighter. As the sun set, Hanuman reappeared, proud of their actions. "You have learned the true meaning of courage. Always remember to help one another." From that day on, Ravi, Leela, and Kishan spread joy and kindness throughout their village, proving that courage and compassion go hand in hand.</a:t>
             </a:r>
           </a:p>
           <a:p/>
@@ -3431,7 +3444,6 @@
           <a:bodyPr/>
           <a:lstStyle/>
           <a:p/>
-          <a:p/>
         </p:txBody>
       </p:sp>
       <p:sp>
@@ -3453,7 +3465,7 @@
       </p:sp>
       <p:pic>
         <p:nvPicPr>
-          <p:cNvPr id="4" name="Picture 3" descr="tmpnu9ayr9a.png"/>
+          <p:cNvPr id="4" name="Picture 3" descr="tmpmv9rxpxe.png"/>
           <p:cNvPicPr>
             <a:picLocks noChangeAspect="1"/>
           </p:cNvPicPr>

</xml_diff>